<commit_message>
fixed the blurry issue
</commit_message>
<xml_diff>
--- a/260finalPresentation.pptx
+++ b/260finalPresentation.pptx
@@ -6590,7 +6590,7 @@
       </p:grpSpPr>
       <p:pic>
         <p:nvPicPr>
-          <p:cNvPr id="8" name="Content Placeholder 7" descr="Screen Shot 2017-12-09 at 8.37.59 PM.png"/>
+          <p:cNvPr id="10" name="Content Placeholder 9" descr="waittime_histo.png"/>
           <p:cNvPicPr>
             <a:picLocks noGrp="1" noChangeAspect="1"/>
           </p:cNvPicPr>
@@ -6606,15 +6606,15 @@
               </a:ext>
             </a:extLst>
           </a:blip>
-          <a:srcRect l="1028" r="1028"/>
+          <a:srcRect l="-13858" r="-13858"/>
           <a:stretch>
             <a:fillRect/>
           </a:stretch>
         </p:blipFill>
         <p:spPr>
           <a:xfrm>
-            <a:off x="457200" y="231775"/>
-            <a:ext cx="8229600" cy="6305550"/>
+            <a:off x="457200" y="201613"/>
+            <a:ext cx="8229600" cy="6443662"/>
           </a:xfrm>
         </p:spPr>
       </p:pic>
@@ -6628,6 +6628,13 @@
   <p:clrMapOvr>
     <a:masterClrMapping/>
   </p:clrMapOvr>
+  <p:timing>
+    <p:tnLst>
+      <p:par>
+        <p:cTn xmlns:p14="http://schemas.microsoft.com/office/powerpoint/2010/main" id="1" dur="indefinite" restart="never" nodeType="tmRoot"/>
+      </p:par>
+    </p:tnLst>
+  </p:timing>
 </p:sld>
 </file>
 
@@ -6650,7 +6657,7 @@
       </p:grpSpPr>
       <p:pic>
         <p:nvPicPr>
-          <p:cNvPr id="4" name="Content Placeholder 3" descr="Screen Shot 2017-12-09 at 8.39.28 PM.png"/>
+          <p:cNvPr id="6" name="Content Placeholder 5" descr="price_am.png"/>
           <p:cNvPicPr>
             <a:picLocks noGrp="1" noChangeAspect="1"/>
           </p:cNvPicPr>
@@ -6666,15 +6673,15 @@
               </a:ext>
             </a:extLst>
           </a:blip>
-          <a:srcRect l="475" r="475"/>
+          <a:srcRect l="-13545" r="-13545"/>
           <a:stretch>
             <a:fillRect/>
           </a:stretch>
         </p:blipFill>
         <p:spPr>
           <a:xfrm>
-            <a:off x="457200" y="309563"/>
-            <a:ext cx="8229600" cy="6273800"/>
+            <a:off x="457200" y="231775"/>
+            <a:ext cx="8229600" cy="6475413"/>
           </a:xfrm>
         </p:spPr>
       </p:pic>
@@ -6688,6 +6695,13 @@
   <p:clrMapOvr>
     <a:masterClrMapping/>
   </p:clrMapOvr>
+  <p:timing>
+    <p:tnLst>
+      <p:par>
+        <p:cTn xmlns:p14="http://schemas.microsoft.com/office/powerpoint/2010/main" id="1" dur="indefinite" restart="never" nodeType="tmRoot"/>
+      </p:par>
+    </p:tnLst>
+  </p:timing>
 </p:sld>
 </file>
 
@@ -6710,7 +6724,7 @@
       </p:grpSpPr>
       <p:pic>
         <p:nvPicPr>
-          <p:cNvPr id="8" name="Content Placeholder 7" descr="price_pm.png"/>
+          <p:cNvPr id="10" name="Content Placeholder 9" descr="price_pm.png"/>
           <p:cNvPicPr>
             <a:picLocks noGrp="1" noChangeAspect="1"/>
           </p:cNvPicPr>
@@ -6718,7 +6732,7 @@
             <p:ph idx="1"/>
           </p:nvPr>
         </p:nvPicPr>
-        <p:blipFill rotWithShape="1">
+        <p:blipFill>
           <a:blip r:embed="rId3">
             <a:extLst>
               <a:ext uri="{28A0092B-C50C-407E-A947-70E740481C1C}">
@@ -6726,13 +6740,15 @@
               </a:ext>
             </a:extLst>
           </a:blip>
-          <a:srcRect l="-39697" t="-501" r="-34482"/>
-          <a:stretch/>
+          <a:srcRect l="-13670" r="-13670"/>
+          <a:stretch>
+            <a:fillRect/>
+          </a:stretch>
         </p:blipFill>
         <p:spPr>
           <a:xfrm>
-            <a:off x="-2664015" y="176825"/>
-            <a:ext cx="13805627" cy="6452575"/>
+            <a:off x="457200" y="160338"/>
+            <a:ext cx="8229600" cy="6462712"/>
           </a:xfrm>
         </p:spPr>
       </p:pic>
@@ -6746,6 +6762,13 @@
   <p:clrMapOvr>
     <a:masterClrMapping/>
   </p:clrMapOvr>
+  <p:timing>
+    <p:tnLst>
+      <p:par>
+        <p:cTn xmlns:p14="http://schemas.microsoft.com/office/powerpoint/2010/main" id="1" dur="indefinite" restart="never" nodeType="tmRoot"/>
+      </p:par>
+    </p:tnLst>
+  </p:timing>
 </p:sld>
 </file>
 
@@ -6768,7 +6791,7 @@
       </p:grpSpPr>
       <p:pic>
         <p:nvPicPr>
-          <p:cNvPr id="4" name="Content Placeholder 3" descr="Screen Shot 2017-12-09 at 8.44.48 PM.png"/>
+          <p:cNvPr id="6" name="Content Placeholder 5" descr="cost_totalduration.png"/>
           <p:cNvPicPr>
             <a:picLocks noGrp="1" noChangeAspect="1"/>
           </p:cNvPicPr>
@@ -6784,15 +6807,15 @@
               </a:ext>
             </a:extLst>
           </a:blip>
-          <a:srcRect l="1855" r="1855"/>
+          <a:srcRect l="-13858" r="-13858"/>
           <a:stretch>
             <a:fillRect/>
           </a:stretch>
         </p:blipFill>
         <p:spPr>
           <a:xfrm>
-            <a:off x="457200" y="293688"/>
-            <a:ext cx="8229600" cy="6211887"/>
+            <a:off x="457200" y="185738"/>
+            <a:ext cx="8229600" cy="6443662"/>
           </a:xfrm>
         </p:spPr>
       </p:pic>
@@ -6806,6 +6829,13 @@
   <p:clrMapOvr>
     <a:masterClrMapping/>
   </p:clrMapOvr>
+  <p:timing>
+    <p:tnLst>
+      <p:par>
+        <p:cTn xmlns:p14="http://schemas.microsoft.com/office/powerpoint/2010/main" id="1" dur="indefinite" restart="never" nodeType="tmRoot"/>
+      </p:par>
+    </p:tnLst>
+  </p:timing>
 </p:sld>
 </file>
 
@@ -6828,7 +6858,7 @@
       </p:grpSpPr>
       <p:pic>
         <p:nvPicPr>
-          <p:cNvPr id="4" name="Content Placeholder 3" descr="Screen Shot 2017-12-09 at 8.46.01 PM.png"/>
+          <p:cNvPr id="6" name="Content Placeholder 5" descr="cost_dur.png"/>
           <p:cNvPicPr>
             <a:picLocks noGrp="1" noChangeAspect="1"/>
           </p:cNvPicPr>
@@ -6844,15 +6874,15 @@
               </a:ext>
             </a:extLst>
           </a:blip>
-          <a:srcRect t="611" b="611"/>
+          <a:srcRect l="-14478" r="-14478"/>
           <a:stretch>
             <a:fillRect/>
           </a:stretch>
         </p:blipFill>
         <p:spPr>
           <a:xfrm>
-            <a:off x="457200" y="217488"/>
-            <a:ext cx="8229600" cy="6365875"/>
+            <a:off x="457200" y="247650"/>
+            <a:ext cx="8229600" cy="6381750"/>
           </a:xfrm>
         </p:spPr>
       </p:pic>
@@ -6866,6 +6896,13 @@
   <p:clrMapOvr>
     <a:masterClrMapping/>
   </p:clrMapOvr>
+  <p:timing>
+    <p:tnLst>
+      <p:par>
+        <p:cTn xmlns:p14="http://schemas.microsoft.com/office/powerpoint/2010/main" id="1" dur="indefinite" restart="never" nodeType="tmRoot"/>
+      </p:par>
+    </p:tnLst>
+  </p:timing>
 </p:sld>
 </file>
 
@@ -6888,7 +6925,7 @@
       </p:grpSpPr>
       <p:pic>
         <p:nvPicPr>
-          <p:cNvPr id="4" name="Content Placeholder 3" descr="Screen Shot 2017-12-09 at 8.47.36 PM.png"/>
+          <p:cNvPr id="6" name="Content Placeholder 5" descr="cost_per_min_boxp.png"/>
           <p:cNvPicPr>
             <a:picLocks noGrp="1" noChangeAspect="1"/>
           </p:cNvPicPr>
@@ -6904,15 +6941,15 @@
               </a:ext>
             </a:extLst>
           </a:blip>
-          <a:srcRect l="2273" r="2273"/>
+          <a:srcRect l="-14784" r="-14784"/>
           <a:stretch>
             <a:fillRect/>
           </a:stretch>
         </p:blipFill>
         <p:spPr>
           <a:xfrm>
-            <a:off x="457200" y="309563"/>
-            <a:ext cx="8229600" cy="6211887"/>
+            <a:off x="457200" y="231775"/>
+            <a:ext cx="8229600" cy="6351588"/>
           </a:xfrm>
         </p:spPr>
       </p:pic>
@@ -6926,6 +6963,13 @@
   <p:clrMapOvr>
     <a:masterClrMapping/>
   </p:clrMapOvr>
+  <p:timing>
+    <p:tnLst>
+      <p:par>
+        <p:cTn xmlns:p14="http://schemas.microsoft.com/office/powerpoint/2010/main" id="1" dur="indefinite" restart="never" nodeType="tmRoot"/>
+      </p:par>
+    </p:tnLst>
+  </p:timing>
 </p:sld>
 </file>
 
@@ -6948,7 +6992,7 @@
       </p:grpSpPr>
       <p:pic>
         <p:nvPicPr>
-          <p:cNvPr id="4" name="Content Placeholder 3" descr="Screen Shot 2017-12-09 at 8.49.29 PM.png"/>
+          <p:cNvPr id="6" name="Content Placeholder 5" descr="pricein15min.png"/>
           <p:cNvPicPr>
             <a:picLocks noGrp="1" noChangeAspect="1"/>
           </p:cNvPicPr>
@@ -6964,15 +7008,15 @@
               </a:ext>
             </a:extLst>
           </a:blip>
-          <a:srcRect l="3395" r="3395"/>
+          <a:srcRect l="-14478" r="-14478"/>
           <a:stretch>
             <a:fillRect/>
           </a:stretch>
         </p:blipFill>
         <p:spPr>
           <a:xfrm>
-            <a:off x="457200" y="309563"/>
-            <a:ext cx="8229600" cy="6227762"/>
+            <a:off x="457200" y="231775"/>
+            <a:ext cx="8229600" cy="6381750"/>
           </a:xfrm>
         </p:spPr>
       </p:pic>
@@ -6986,6 +7030,13 @@
   <p:clrMapOvr>
     <a:masterClrMapping/>
   </p:clrMapOvr>
+  <p:timing>
+    <p:tnLst>
+      <p:par>
+        <p:cTn xmlns:p14="http://schemas.microsoft.com/office/powerpoint/2010/main" id="1" dur="indefinite" restart="never" nodeType="tmRoot"/>
+      </p:par>
+    </p:tnLst>
+  </p:timing>
 </p:sld>
 </file>
 
@@ -7008,7 +7059,7 @@
       </p:grpSpPr>
       <p:pic>
         <p:nvPicPr>
-          <p:cNvPr id="4" name="Content Placeholder 3" descr="Screen Shot 2017-12-09 at 8.47.52 PM.png"/>
+          <p:cNvPr id="6" name="Content Placeholder 5" descr="choicescheme_lyft.png"/>
           <p:cNvPicPr>
             <a:picLocks noGrp="1" noChangeAspect="1"/>
           </p:cNvPicPr>
@@ -7024,15 +7075,15 @@
               </a:ext>
             </a:extLst>
           </a:blip>
-          <a:srcRect l="1487" r="1487"/>
+          <a:srcRect l="-15587" r="-15587"/>
           <a:stretch>
             <a:fillRect/>
           </a:stretch>
         </p:blipFill>
         <p:spPr>
           <a:xfrm>
-            <a:off x="457200" y="341313"/>
-            <a:ext cx="8229600" cy="6102350"/>
+            <a:off x="457200" y="293688"/>
+            <a:ext cx="8229600" cy="6273800"/>
           </a:xfrm>
         </p:spPr>
       </p:pic>
@@ -7046,6 +7097,13 @@
   <p:clrMapOvr>
     <a:masterClrMapping/>
   </p:clrMapOvr>
+  <p:timing>
+    <p:tnLst>
+      <p:par>
+        <p:cTn xmlns:p14="http://schemas.microsoft.com/office/powerpoint/2010/main" id="1" dur="indefinite" restart="never" nodeType="tmRoot"/>
+      </p:par>
+    </p:tnLst>
+  </p:timing>
 </p:sld>
 </file>
 
@@ -7404,6 +7462,13 @@
   <p:clrMapOvr>
     <a:masterClrMapping/>
   </p:clrMapOvr>
+  <p:timing>
+    <p:tnLst>
+      <p:par>
+        <p:cTn xmlns:p14="http://schemas.microsoft.com/office/powerpoint/2010/main" id="1" dur="indefinite" restart="never" nodeType="tmRoot"/>
+      </p:par>
+    </p:tnLst>
+  </p:timing>
 </p:sld>
 </file>
 
@@ -7426,7 +7491,7 @@
       </p:grpSpPr>
       <p:pic>
         <p:nvPicPr>
-          <p:cNvPr id="4" name="Content Placeholder 3" descr="Screen Shot 2017-12-09 at 8.31.22 PM.png"/>
+          <p:cNvPr id="7" name="Content Placeholder 6" descr="ridereq_distr.png"/>
           <p:cNvPicPr>
             <a:picLocks noGrp="1" noChangeAspect="1"/>
           </p:cNvPicPr>
@@ -7442,15 +7507,15 @@
               </a:ext>
             </a:extLst>
           </a:blip>
-          <a:srcRect t="6376" b="6376"/>
+          <a:srcRect l="-12353" r="-12353"/>
           <a:stretch>
             <a:fillRect/>
           </a:stretch>
         </p:blipFill>
         <p:spPr>
           <a:xfrm>
-            <a:off x="457200" y="557213"/>
-            <a:ext cx="8229600" cy="5918200"/>
+            <a:off x="457200" y="123825"/>
+            <a:ext cx="8229600" cy="6599238"/>
           </a:xfrm>
         </p:spPr>
       </p:pic>
@@ -7464,6 +7529,13 @@
   <p:clrMapOvr>
     <a:masterClrMapping/>
   </p:clrMapOvr>
+  <p:timing>
+    <p:tnLst>
+      <p:par>
+        <p:cTn xmlns:p14="http://schemas.microsoft.com/office/powerpoint/2010/main" id="1" dur="indefinite" restart="never" nodeType="tmRoot"/>
+      </p:par>
+    </p:tnLst>
+  </p:timing>
 </p:sld>
 </file>
 
@@ -7486,7 +7558,7 @@
       </p:grpSpPr>
       <p:pic>
         <p:nvPicPr>
-          <p:cNvPr id="7" name="Content Placeholder 6" descr="Screen Shot 2017-12-09 at 8.33.30 PM.png"/>
+          <p:cNvPr id="9" name="Content Placeholder 8" descr="ridecost_distr_boxp.png"/>
           <p:cNvPicPr>
             <a:picLocks noGrp="1" noChangeAspect="1"/>
           </p:cNvPicPr>
@@ -7502,15 +7574,15 @@
               </a:ext>
             </a:extLst>
           </a:blip>
-          <a:srcRect l="3201" r="3201"/>
+          <a:srcRect l="-13561" r="-13561"/>
           <a:stretch>
             <a:fillRect/>
           </a:stretch>
         </p:blipFill>
         <p:spPr>
           <a:xfrm>
-            <a:off x="457200" y="263525"/>
-            <a:ext cx="8229600" cy="6365875"/>
+            <a:off x="457200" y="155575"/>
+            <a:ext cx="8229600" cy="6473825"/>
           </a:xfrm>
         </p:spPr>
       </p:pic>
@@ -7524,6 +7596,13 @@
   <p:clrMapOvr>
     <a:masterClrMapping/>
   </p:clrMapOvr>
+  <p:timing>
+    <p:tnLst>
+      <p:par>
+        <p:cTn xmlns:p14="http://schemas.microsoft.com/office/powerpoint/2010/main" id="1" dur="indefinite" restart="never" nodeType="tmRoot"/>
+      </p:par>
+    </p:tnLst>
+  </p:timing>
 </p:sld>
 </file>
 
@@ -7546,7 +7625,7 @@
       </p:grpSpPr>
       <p:pic>
         <p:nvPicPr>
-          <p:cNvPr id="4" name="Content Placeholder 3" descr="Screen Shot 2017-12-09 at 8.36.03 PM.png"/>
+          <p:cNvPr id="6" name="Content Placeholder 5" descr="totalduration_boxp.png"/>
           <p:cNvPicPr>
             <a:picLocks noGrp="1" noChangeAspect="1"/>
           </p:cNvPicPr>
@@ -7562,15 +7641,15 @@
               </a:ext>
             </a:extLst>
           </a:blip>
-          <a:srcRect l="2891" r="2891"/>
+          <a:srcRect l="-13112" r="-13112"/>
           <a:stretch>
             <a:fillRect/>
           </a:stretch>
         </p:blipFill>
         <p:spPr>
           <a:xfrm>
-            <a:off x="457200" y="387350"/>
-            <a:ext cx="8229600" cy="6335713"/>
+            <a:off x="457200" y="155575"/>
+            <a:ext cx="8229600" cy="6519863"/>
           </a:xfrm>
         </p:spPr>
       </p:pic>
@@ -7584,6 +7663,13 @@
   <p:clrMapOvr>
     <a:masterClrMapping/>
   </p:clrMapOvr>
+  <p:timing>
+    <p:tnLst>
+      <p:par>
+        <p:cTn xmlns:p14="http://schemas.microsoft.com/office/powerpoint/2010/main" id="1" dur="indefinite" restart="never" nodeType="tmRoot"/>
+      </p:par>
+    </p:tnLst>
+  </p:timing>
 </p:sld>
 </file>
 

</xml_diff>